<commit_message>
WFSMs simulation and visios
</commit_message>
<xml_diff>
--- a/Test-Result/2022.12.01/New Microsoft PowerPoint Presentation.pptx
+++ b/Test-Result/2022.12.01/New Microsoft PowerPoint Presentation.pptx
@@ -18,9 +18,10 @@
     <p:sldId id="262" r:id="rId12"/>
     <p:sldId id="267" r:id="rId13"/>
     <p:sldId id="269" r:id="rId14"/>
-    <p:sldId id="261" r:id="rId15"/>
-    <p:sldId id="263" r:id="rId16"/>
-    <p:sldId id="268" r:id="rId17"/>
+    <p:sldId id="272" r:id="rId15"/>
+    <p:sldId id="261" r:id="rId16"/>
+    <p:sldId id="263" r:id="rId17"/>
+    <p:sldId id="268" r:id="rId18"/>
   </p:sldIdLst>
   <p:sldSz cx="12192000" cy="6858000"/>
   <p:notesSz cx="6858000" cy="9144000"/>
@@ -274,7 +275,7 @@
           <a:p>
             <a:fld id="{818D92CC-00E8-4D30-8D68-0F4CD445B4D9}" type="datetimeFigureOut">
               <a:rPr lang="en-US" smtClean="0"/>
-              <a:t>1/6/2022</a:t>
+              <a:t>3/21/2022</a:t>
             </a:fld>
             <a:endParaRPr lang="en-US"/>
           </a:p>
@@ -472,7 +473,7 @@
           <a:p>
             <a:fld id="{818D92CC-00E8-4D30-8D68-0F4CD445B4D9}" type="datetimeFigureOut">
               <a:rPr lang="en-US" smtClean="0"/>
-              <a:t>1/6/2022</a:t>
+              <a:t>3/21/2022</a:t>
             </a:fld>
             <a:endParaRPr lang="en-US"/>
           </a:p>
@@ -680,7 +681,7 @@
           <a:p>
             <a:fld id="{818D92CC-00E8-4D30-8D68-0F4CD445B4D9}" type="datetimeFigureOut">
               <a:rPr lang="en-US" smtClean="0"/>
-              <a:t>1/6/2022</a:t>
+              <a:t>3/21/2022</a:t>
             </a:fld>
             <a:endParaRPr lang="en-US"/>
           </a:p>
@@ -878,7 +879,7 @@
           <a:p>
             <a:fld id="{818D92CC-00E8-4D30-8D68-0F4CD445B4D9}" type="datetimeFigureOut">
               <a:rPr lang="en-US" smtClean="0"/>
-              <a:t>1/6/2022</a:t>
+              <a:t>3/21/2022</a:t>
             </a:fld>
             <a:endParaRPr lang="en-US"/>
           </a:p>
@@ -1153,7 +1154,7 @@
           <a:p>
             <a:fld id="{818D92CC-00E8-4D30-8D68-0F4CD445B4D9}" type="datetimeFigureOut">
               <a:rPr lang="en-US" smtClean="0"/>
-              <a:t>1/6/2022</a:t>
+              <a:t>3/21/2022</a:t>
             </a:fld>
             <a:endParaRPr lang="en-US"/>
           </a:p>
@@ -1418,7 +1419,7 @@
           <a:p>
             <a:fld id="{818D92CC-00E8-4D30-8D68-0F4CD445B4D9}" type="datetimeFigureOut">
               <a:rPr lang="en-US" smtClean="0"/>
-              <a:t>1/6/2022</a:t>
+              <a:t>3/21/2022</a:t>
             </a:fld>
             <a:endParaRPr lang="en-US"/>
           </a:p>
@@ -1830,7 +1831,7 @@
           <a:p>
             <a:fld id="{818D92CC-00E8-4D30-8D68-0F4CD445B4D9}" type="datetimeFigureOut">
               <a:rPr lang="en-US" smtClean="0"/>
-              <a:t>1/6/2022</a:t>
+              <a:t>3/21/2022</a:t>
             </a:fld>
             <a:endParaRPr lang="en-US"/>
           </a:p>
@@ -1971,7 +1972,7 @@
           <a:p>
             <a:fld id="{818D92CC-00E8-4D30-8D68-0F4CD445B4D9}" type="datetimeFigureOut">
               <a:rPr lang="en-US" smtClean="0"/>
-              <a:t>1/6/2022</a:t>
+              <a:t>3/21/2022</a:t>
             </a:fld>
             <a:endParaRPr lang="en-US"/>
           </a:p>
@@ -2084,7 +2085,7 @@
           <a:p>
             <a:fld id="{818D92CC-00E8-4D30-8D68-0F4CD445B4D9}" type="datetimeFigureOut">
               <a:rPr lang="en-US" smtClean="0"/>
-              <a:t>1/6/2022</a:t>
+              <a:t>3/21/2022</a:t>
             </a:fld>
             <a:endParaRPr lang="en-US"/>
           </a:p>
@@ -2395,7 +2396,7 @@
           <a:p>
             <a:fld id="{818D92CC-00E8-4D30-8D68-0F4CD445B4D9}" type="datetimeFigureOut">
               <a:rPr lang="en-US" smtClean="0"/>
-              <a:t>1/6/2022</a:t>
+              <a:t>3/21/2022</a:t>
             </a:fld>
             <a:endParaRPr lang="en-US"/>
           </a:p>
@@ -2683,7 +2684,7 @@
           <a:p>
             <a:fld id="{818D92CC-00E8-4D30-8D68-0F4CD445B4D9}" type="datetimeFigureOut">
               <a:rPr lang="en-US" smtClean="0"/>
-              <a:t>1/6/2022</a:t>
+              <a:t>3/21/2022</a:t>
             </a:fld>
             <a:endParaRPr lang="en-US"/>
           </a:p>
@@ -2924,7 +2925,7 @@
           <a:p>
             <a:fld id="{818D92CC-00E8-4D30-8D68-0F4CD445B4D9}" type="datetimeFigureOut">
               <a:rPr lang="en-US" smtClean="0"/>
-              <a:t>1/6/2022</a:t>
+              <a:t>3/21/2022</a:t>
             </a:fld>
             <a:endParaRPr lang="en-US"/>
           </a:p>
@@ -4727,46 +4728,12 @@
           <a:chExt cx="0" cy="0"/>
         </a:xfrm>
       </p:grpSpPr>
-      <p:sp>
-        <p:nvSpPr>
-          <p:cNvPr id="13" name="Rectangle 12">
-            <a:extLst>
-              <a:ext uri="{FF2B5EF4-FFF2-40B4-BE49-F238E27FC236}">
-                <a16:creationId xmlns:a16="http://schemas.microsoft.com/office/drawing/2014/main" id="{E36B8128-D131-456B-908A-2D87E8F88099}"/>
-              </a:ext>
-            </a:extLst>
-          </p:cNvPr>
-          <p:cNvSpPr/>
-          <p:nvPr/>
-        </p:nvSpPr>
-        <p:spPr>
-          <a:xfrm>
-            <a:off x="4285306" y="1428241"/>
-            <a:ext cx="4491999" cy="369332"/>
-          </a:xfrm>
-          <a:prstGeom prst="rect">
-            <a:avLst/>
-          </a:prstGeom>
-        </p:spPr>
-        <p:txBody>
-          <a:bodyPr wrap="none">
-            <a:spAutoFit/>
-          </a:bodyPr>
-          <a:lstStyle/>
-          <a:p>
-            <a:r>
-              <a:rPr lang="en-US" dirty="0"/>
-              <a:t>D:\Github\WPTMotor\Test-Result\2021.11.29</a:t>
-            </a:r>
-          </a:p>
-        </p:txBody>
-      </p:sp>
       <p:pic>
         <p:nvPicPr>
-          <p:cNvPr id="24" name="Picture 23">
-            <a:extLst>
-              <a:ext uri="{FF2B5EF4-FFF2-40B4-BE49-F238E27FC236}">
-                <a16:creationId xmlns:a16="http://schemas.microsoft.com/office/drawing/2014/main" id="{8B2D3155-26C4-401B-B921-01E93EBF55DF}"/>
+          <p:cNvPr id="6" name="Picture 5">
+            <a:extLst>
+              <a:ext uri="{FF2B5EF4-FFF2-40B4-BE49-F238E27FC236}">
+                <a16:creationId xmlns:a16="http://schemas.microsoft.com/office/drawing/2014/main" id="{41BDAA32-E734-4E72-868A-088FE7E23400}"/>
               </a:ext>
             </a:extLst>
           </p:cNvPr>
@@ -4783,8 +4750,250 @@
         </p:blipFill>
         <p:spPr>
           <a:xfrm>
-            <a:off x="4532290" y="2160968"/>
-            <a:ext cx="3810000" cy="1905000"/>
+            <a:off x="2945130" y="1340569"/>
+            <a:ext cx="2857500" cy="1905000"/>
+          </a:xfrm>
+          <a:prstGeom prst="rect">
+            <a:avLst/>
+          </a:prstGeom>
+        </p:spPr>
+      </p:pic>
+      <p:pic>
+        <p:nvPicPr>
+          <p:cNvPr id="7" name="Picture 6">
+            <a:extLst>
+              <a:ext uri="{FF2B5EF4-FFF2-40B4-BE49-F238E27FC236}">
+                <a16:creationId xmlns:a16="http://schemas.microsoft.com/office/drawing/2014/main" id="{3E0A5E8A-C834-4731-A5D2-A3C1A7EA1493}"/>
+              </a:ext>
+            </a:extLst>
+          </p:cNvPr>
+          <p:cNvPicPr>
+            <a:picLocks noChangeAspect="1"/>
+          </p:cNvPicPr>
+          <p:nvPr/>
+        </p:nvPicPr>
+        <p:blipFill>
+          <a:blip r:embed="rId3"/>
+          <a:stretch>
+            <a:fillRect/>
+          </a:stretch>
+        </p:blipFill>
+        <p:spPr>
+          <a:xfrm>
+            <a:off x="5703496" y="1340569"/>
+            <a:ext cx="2857500" cy="1905000"/>
+          </a:xfrm>
+          <a:prstGeom prst="rect">
+            <a:avLst/>
+          </a:prstGeom>
+        </p:spPr>
+      </p:pic>
+      <p:sp>
+        <p:nvSpPr>
+          <p:cNvPr id="9" name="TextBox 8">
+            <a:extLst>
+              <a:ext uri="{FF2B5EF4-FFF2-40B4-BE49-F238E27FC236}">
+                <a16:creationId xmlns:a16="http://schemas.microsoft.com/office/drawing/2014/main" id="{18810AA3-E71B-4EE9-8F38-1093E13C1C45}"/>
+              </a:ext>
+            </a:extLst>
+          </p:cNvPr>
+          <p:cNvSpPr txBox="1"/>
+          <p:nvPr/>
+        </p:nvSpPr>
+        <p:spPr>
+          <a:xfrm>
+            <a:off x="4275221" y="3184609"/>
+            <a:ext cx="566670" cy="338554"/>
+          </a:xfrm>
+          <a:prstGeom prst="rect">
+            <a:avLst/>
+          </a:prstGeom>
+          <a:noFill/>
+        </p:spPr>
+        <p:txBody>
+          <a:bodyPr wrap="square" rtlCol="0">
+            <a:spAutoFit/>
+          </a:bodyPr>
+          <a:lstStyle/>
+          <a:p>
+            <a:r>
+              <a:rPr lang="en-US" sz="1600" dirty="0">
+                <a:latin typeface="Times New Roman" panose="02020603050405020304" pitchFamily="18" charset="0"/>
+                <a:cs typeface="Times New Roman" panose="02020603050405020304" pitchFamily="18" charset="0"/>
+              </a:rPr>
+              <a:t>a)</a:t>
+            </a:r>
+          </a:p>
+        </p:txBody>
+      </p:sp>
+      <p:sp>
+        <p:nvSpPr>
+          <p:cNvPr id="10" name="TextBox 9">
+            <a:extLst>
+              <a:ext uri="{FF2B5EF4-FFF2-40B4-BE49-F238E27FC236}">
+                <a16:creationId xmlns:a16="http://schemas.microsoft.com/office/drawing/2014/main" id="{2754EB56-F535-4128-BAF6-7E6056874781}"/>
+              </a:ext>
+            </a:extLst>
+          </p:cNvPr>
+          <p:cNvSpPr txBox="1"/>
+          <p:nvPr/>
+        </p:nvSpPr>
+        <p:spPr>
+          <a:xfrm>
+            <a:off x="7044985" y="3184609"/>
+            <a:ext cx="610251" cy="338554"/>
+          </a:xfrm>
+          <a:prstGeom prst="rect">
+            <a:avLst/>
+          </a:prstGeom>
+          <a:noFill/>
+        </p:spPr>
+        <p:txBody>
+          <a:bodyPr wrap="square" rtlCol="0">
+            <a:spAutoFit/>
+          </a:bodyPr>
+          <a:lstStyle/>
+          <a:p>
+            <a:r>
+              <a:rPr lang="en-US" sz="1600" dirty="0">
+                <a:latin typeface="Times New Roman" panose="02020603050405020304" pitchFamily="18" charset="0"/>
+                <a:cs typeface="Times New Roman" panose="02020603050405020304" pitchFamily="18" charset="0"/>
+              </a:rPr>
+              <a:t>b)</a:t>
+            </a:r>
+          </a:p>
+        </p:txBody>
+      </p:sp>
+      <p:sp>
+        <p:nvSpPr>
+          <p:cNvPr id="11" name="TextBox 10">
+            <a:extLst>
+              <a:ext uri="{FF2B5EF4-FFF2-40B4-BE49-F238E27FC236}">
+                <a16:creationId xmlns:a16="http://schemas.microsoft.com/office/drawing/2014/main" id="{B682E5B3-8DE0-4CFC-BEE6-5B08469124E5}"/>
+              </a:ext>
+            </a:extLst>
+          </p:cNvPr>
+          <p:cNvSpPr txBox="1"/>
+          <p:nvPr/>
+        </p:nvSpPr>
+        <p:spPr>
+          <a:xfrm>
+            <a:off x="5637530" y="5178877"/>
+            <a:ext cx="566670" cy="338554"/>
+          </a:xfrm>
+          <a:prstGeom prst="rect">
+            <a:avLst/>
+          </a:prstGeom>
+          <a:noFill/>
+        </p:spPr>
+        <p:txBody>
+          <a:bodyPr wrap="square" rtlCol="0">
+            <a:spAutoFit/>
+          </a:bodyPr>
+          <a:lstStyle/>
+          <a:p>
+            <a:r>
+              <a:rPr lang="en-US" sz="1600" dirty="0">
+                <a:latin typeface="Times New Roman" panose="02020603050405020304" pitchFamily="18" charset="0"/>
+                <a:cs typeface="Times New Roman" panose="02020603050405020304" pitchFamily="18" charset="0"/>
+              </a:rPr>
+              <a:t>c)</a:t>
+            </a:r>
+          </a:p>
+        </p:txBody>
+      </p:sp>
+      <p:sp>
+        <p:nvSpPr>
+          <p:cNvPr id="15" name="Rectangle 14">
+            <a:extLst>
+              <a:ext uri="{FF2B5EF4-FFF2-40B4-BE49-F238E27FC236}">
+                <a16:creationId xmlns:a16="http://schemas.microsoft.com/office/drawing/2014/main" id="{512C3867-8BE4-4A07-A8B0-DFB2C9AB8FA7}"/>
+              </a:ext>
+            </a:extLst>
+          </p:cNvPr>
+          <p:cNvSpPr/>
+          <p:nvPr/>
+        </p:nvSpPr>
+        <p:spPr>
+          <a:xfrm>
+            <a:off x="3798485" y="320830"/>
+            <a:ext cx="4491999" cy="369332"/>
+          </a:xfrm>
+          <a:prstGeom prst="rect">
+            <a:avLst/>
+          </a:prstGeom>
+        </p:spPr>
+        <p:txBody>
+          <a:bodyPr wrap="none">
+            <a:spAutoFit/>
+          </a:bodyPr>
+          <a:lstStyle/>
+          <a:p>
+            <a:r>
+              <a:rPr lang="en-US" dirty="0"/>
+              <a:t>D:\Github\WPTMotor\Test-Result\2021.11.29</a:t>
+            </a:r>
+          </a:p>
+        </p:txBody>
+      </p:sp>
+      <p:sp>
+        <p:nvSpPr>
+          <p:cNvPr id="16" name="Rectangle 15">
+            <a:extLst>
+              <a:ext uri="{FF2B5EF4-FFF2-40B4-BE49-F238E27FC236}">
+                <a16:creationId xmlns:a16="http://schemas.microsoft.com/office/drawing/2014/main" id="{FE2F45BE-7D98-43AC-85E3-83D2B59CFDD9}"/>
+              </a:ext>
+            </a:extLst>
+          </p:cNvPr>
+          <p:cNvSpPr/>
+          <p:nvPr/>
+        </p:nvSpPr>
+        <p:spPr>
+          <a:xfrm>
+            <a:off x="4611981" y="5691320"/>
+            <a:ext cx="2738827" cy="369332"/>
+          </a:xfrm>
+          <a:prstGeom prst="rect">
+            <a:avLst/>
+          </a:prstGeom>
+        </p:spPr>
+        <p:txBody>
+          <a:bodyPr wrap="none">
+            <a:spAutoFit/>
+          </a:bodyPr>
+          <a:lstStyle/>
+          <a:p>
+            <a:r>
+              <a:rPr lang="en-US" dirty="0"/>
+              <a:t>Plotter_all_WPT_motor_v2</a:t>
+            </a:r>
+          </a:p>
+        </p:txBody>
+      </p:sp>
+      <p:pic>
+        <p:nvPicPr>
+          <p:cNvPr id="2" name="Picture 1">
+            <a:extLst>
+              <a:ext uri="{FF2B5EF4-FFF2-40B4-BE49-F238E27FC236}">
+                <a16:creationId xmlns:a16="http://schemas.microsoft.com/office/drawing/2014/main" id="{C00A17D0-64E5-4897-8CD2-865C8411E36D}"/>
+              </a:ext>
+            </a:extLst>
+          </p:cNvPr>
+          <p:cNvPicPr>
+            <a:picLocks noChangeAspect="1"/>
+          </p:cNvPicPr>
+          <p:nvPr/>
+        </p:nvPicPr>
+        <p:blipFill>
+          <a:blip r:embed="rId4"/>
+          <a:stretch>
+            <a:fillRect/>
+          </a:stretch>
+        </p:blipFill>
+        <p:spPr>
+          <a:xfrm>
+            <a:off x="3322246" y="3377147"/>
+            <a:ext cx="4762500" cy="1905000"/>
           </a:xfrm>
           <a:prstGeom prst="rect">
             <a:avLst/>
@@ -4794,7 +5003,7 @@
     </p:spTree>
     <p:extLst>
       <p:ext uri="{BB962C8B-B14F-4D97-AF65-F5344CB8AC3E}">
-        <p14:creationId xmlns:p14="http://schemas.microsoft.com/office/powerpoint/2010/main" val="2958766520"/>
+        <p14:creationId xmlns:p14="http://schemas.microsoft.com/office/powerpoint/2010/main" val="38750144"/>
       </p:ext>
     </p:extLst>
   </p:cSld>
@@ -4821,6 +5030,100 @@
           <a:chExt cx="0" cy="0"/>
         </a:xfrm>
       </p:grpSpPr>
+      <p:sp>
+        <p:nvSpPr>
+          <p:cNvPr id="13" name="Rectangle 12">
+            <a:extLst>
+              <a:ext uri="{FF2B5EF4-FFF2-40B4-BE49-F238E27FC236}">
+                <a16:creationId xmlns:a16="http://schemas.microsoft.com/office/drawing/2014/main" id="{E36B8128-D131-456B-908A-2D87E8F88099}"/>
+              </a:ext>
+            </a:extLst>
+          </p:cNvPr>
+          <p:cNvSpPr/>
+          <p:nvPr/>
+        </p:nvSpPr>
+        <p:spPr>
+          <a:xfrm>
+            <a:off x="4285306" y="1428241"/>
+            <a:ext cx="4491999" cy="369332"/>
+          </a:xfrm>
+          <a:prstGeom prst="rect">
+            <a:avLst/>
+          </a:prstGeom>
+        </p:spPr>
+        <p:txBody>
+          <a:bodyPr wrap="none">
+            <a:spAutoFit/>
+          </a:bodyPr>
+          <a:lstStyle/>
+          <a:p>
+            <a:r>
+              <a:rPr lang="en-US" dirty="0"/>
+              <a:t>D:\Github\WPTMotor\Test-Result\2021.11.29</a:t>
+            </a:r>
+          </a:p>
+        </p:txBody>
+      </p:sp>
+      <p:pic>
+        <p:nvPicPr>
+          <p:cNvPr id="24" name="Picture 23">
+            <a:extLst>
+              <a:ext uri="{FF2B5EF4-FFF2-40B4-BE49-F238E27FC236}">
+                <a16:creationId xmlns:a16="http://schemas.microsoft.com/office/drawing/2014/main" id="{8B2D3155-26C4-401B-B921-01E93EBF55DF}"/>
+              </a:ext>
+            </a:extLst>
+          </p:cNvPr>
+          <p:cNvPicPr>
+            <a:picLocks noChangeAspect="1"/>
+          </p:cNvPicPr>
+          <p:nvPr/>
+        </p:nvPicPr>
+        <p:blipFill>
+          <a:blip r:embed="rId2"/>
+          <a:stretch>
+            <a:fillRect/>
+          </a:stretch>
+        </p:blipFill>
+        <p:spPr>
+          <a:xfrm>
+            <a:off x="4532290" y="2160968"/>
+            <a:ext cx="3810000" cy="1905000"/>
+          </a:xfrm>
+          <a:prstGeom prst="rect">
+            <a:avLst/>
+          </a:prstGeom>
+        </p:spPr>
+      </p:pic>
+    </p:spTree>
+    <p:extLst>
+      <p:ext uri="{BB962C8B-B14F-4D97-AF65-F5344CB8AC3E}">
+        <p14:creationId xmlns:p14="http://schemas.microsoft.com/office/powerpoint/2010/main" val="2958766520"/>
+      </p:ext>
+    </p:extLst>
+  </p:cSld>
+  <p:clrMapOvr>
+    <a:masterClrMapping/>
+  </p:clrMapOvr>
+</p:sld>
+</file>
+
+<file path=ppt/slides/slide16.xml><?xml version="1.0" encoding="utf-8"?>
+<p:sld xmlns:a="http://schemas.openxmlformats.org/drawingml/2006/main" xmlns:r="http://schemas.openxmlformats.org/officeDocument/2006/relationships" xmlns:p="http://schemas.openxmlformats.org/presentationml/2006/main">
+  <p:cSld>
+    <p:spTree>
+      <p:nvGrpSpPr>
+        <p:cNvPr id="1" name=""/>
+        <p:cNvGrpSpPr/>
+        <p:nvPr/>
+      </p:nvGrpSpPr>
+      <p:grpSpPr>
+        <a:xfrm>
+          <a:off x="0" y="0"/>
+          <a:ext cx="0" cy="0"/>
+          <a:chOff x="0" y="0"/>
+          <a:chExt cx="0" cy="0"/>
+        </a:xfrm>
+      </p:grpSpPr>
       <p:pic>
         <p:nvPicPr>
           <p:cNvPr id="5" name="Picture 4">
@@ -4928,7 +5231,7 @@
 </p:sld>
 </file>
 
-<file path=ppt/slides/slide16.xml><?xml version="1.0" encoding="utf-8"?>
+<file path=ppt/slides/slide17.xml><?xml version="1.0" encoding="utf-8"?>
 <p:sld xmlns:a="http://schemas.openxmlformats.org/drawingml/2006/main" xmlns:r="http://schemas.openxmlformats.org/officeDocument/2006/relationships" xmlns:p="http://schemas.openxmlformats.org/presentationml/2006/main">
   <p:cSld>
     <p:spTree>
@@ -6523,8 +6826,8 @@
           </a:fontRef>
         </p:style>
       </p:cxnSp>
-      <mc:AlternateContent xmlns:mc="http://schemas.openxmlformats.org/markup-compatibility/2006">
-        <mc:Choice xmlns:a14="http://schemas.microsoft.com/office/drawing/2010/main" Requires="a14">
+      <mc:AlternateContent xmlns:mc="http://schemas.openxmlformats.org/markup-compatibility/2006" xmlns:a14="http://schemas.microsoft.com/office/drawing/2010/main">
+        <mc:Choice Requires="a14">
           <p:sp>
             <p:nvSpPr>
               <p:cNvPr id="8" name="TextBox 7">
@@ -6593,7 +6896,7 @@
             </p:txBody>
           </p:sp>
         </mc:Choice>
-        <mc:Fallback>
+        <mc:Fallback xmlns="">
           <p:sp>
             <p:nvSpPr>
               <p:cNvPr id="8" name="TextBox 7">
@@ -6638,8 +6941,8 @@
           </p:sp>
         </mc:Fallback>
       </mc:AlternateContent>
-      <mc:AlternateContent xmlns:mc="http://schemas.openxmlformats.org/markup-compatibility/2006">
-        <mc:Choice xmlns:a14="http://schemas.microsoft.com/office/drawing/2010/main" Requires="a14">
+      <mc:AlternateContent xmlns:mc="http://schemas.openxmlformats.org/markup-compatibility/2006" xmlns:a14="http://schemas.microsoft.com/office/drawing/2010/main">
+        <mc:Choice Requires="a14">
           <p:sp>
             <p:nvSpPr>
               <p:cNvPr id="9" name="TextBox 8">
@@ -6708,7 +7011,7 @@
             </p:txBody>
           </p:sp>
         </mc:Choice>
-        <mc:Fallback>
+        <mc:Fallback xmlns="">
           <p:sp>
             <p:nvSpPr>
               <p:cNvPr id="9" name="TextBox 8">
@@ -7527,8 +7830,8 @@
           </a:fontRef>
         </p:style>
       </p:cxnSp>
-      <mc:AlternateContent xmlns:mc="http://schemas.openxmlformats.org/markup-compatibility/2006">
-        <mc:Choice xmlns:a14="http://schemas.microsoft.com/office/drawing/2010/main" Requires="a14">
+      <mc:AlternateContent xmlns:mc="http://schemas.openxmlformats.org/markup-compatibility/2006" xmlns:a14="http://schemas.microsoft.com/office/drawing/2010/main">
+        <mc:Choice Requires="a14">
           <p:sp>
             <p:nvSpPr>
               <p:cNvPr id="9" name="TextBox 8">
@@ -7597,7 +7900,7 @@
             </p:txBody>
           </p:sp>
         </mc:Choice>
-        <mc:Fallback>
+        <mc:Fallback xmlns="">
           <p:sp>
             <p:nvSpPr>
               <p:cNvPr id="9" name="TextBox 8">
@@ -7642,8 +7945,8 @@
           </p:sp>
         </mc:Fallback>
       </mc:AlternateContent>
-      <mc:AlternateContent xmlns:mc="http://schemas.openxmlformats.org/markup-compatibility/2006">
-        <mc:Choice xmlns:a14="http://schemas.microsoft.com/office/drawing/2010/main" Requires="a14">
+      <mc:AlternateContent xmlns:mc="http://schemas.openxmlformats.org/markup-compatibility/2006" xmlns:a14="http://schemas.microsoft.com/office/drawing/2010/main">
+        <mc:Choice Requires="a14">
           <p:sp>
             <p:nvSpPr>
               <p:cNvPr id="10" name="TextBox 9">
@@ -7712,7 +8015,7 @@
             </p:txBody>
           </p:sp>
         </mc:Choice>
-        <mc:Fallback>
+        <mc:Fallback xmlns="">
           <p:sp>
             <p:nvSpPr>
               <p:cNvPr id="10" name="TextBox 9">
@@ -8965,8 +9268,8 @@
           </a:fontRef>
         </p:style>
       </p:cxnSp>
-      <mc:AlternateContent xmlns:mc="http://schemas.openxmlformats.org/markup-compatibility/2006">
-        <mc:Choice xmlns:a14="http://schemas.microsoft.com/office/drawing/2010/main" Requires="a14">
+      <mc:AlternateContent xmlns:mc="http://schemas.openxmlformats.org/markup-compatibility/2006" xmlns:a14="http://schemas.microsoft.com/office/drawing/2010/main">
+        <mc:Choice Requires="a14">
           <p:sp>
             <p:nvSpPr>
               <p:cNvPr id="7" name="TextBox 6">
@@ -9035,7 +9338,7 @@
             </p:txBody>
           </p:sp>
         </mc:Choice>
-        <mc:Fallback>
+        <mc:Fallback xmlns="">
           <p:sp>
             <p:nvSpPr>
               <p:cNvPr id="7" name="TextBox 6">
@@ -9126,8 +9429,8 @@
           </a:fontRef>
         </p:style>
       </p:cxnSp>
-      <mc:AlternateContent xmlns:mc="http://schemas.openxmlformats.org/markup-compatibility/2006">
-        <mc:Choice xmlns:a14="http://schemas.microsoft.com/office/drawing/2010/main" Requires="a14">
+      <mc:AlternateContent xmlns:mc="http://schemas.openxmlformats.org/markup-compatibility/2006" xmlns:a14="http://schemas.microsoft.com/office/drawing/2010/main">
+        <mc:Choice Requires="a14">
           <p:sp>
             <p:nvSpPr>
               <p:cNvPr id="9" name="TextBox 8">
@@ -9196,7 +9499,7 @@
             </p:txBody>
           </p:sp>
         </mc:Choice>
-        <mc:Fallback>
+        <mc:Fallback xmlns="">
           <p:sp>
             <p:nvSpPr>
               <p:cNvPr id="9" name="TextBox 8">
@@ -9377,8 +9680,8 @@
           </a:fontRef>
         </p:style>
       </p:cxnSp>
-      <mc:AlternateContent xmlns:mc="http://schemas.openxmlformats.org/markup-compatibility/2006">
-        <mc:Choice xmlns:a14="http://schemas.microsoft.com/office/drawing/2010/main" Requires="a14">
+      <mc:AlternateContent xmlns:mc="http://schemas.openxmlformats.org/markup-compatibility/2006" xmlns:a14="http://schemas.microsoft.com/office/drawing/2010/main">
+        <mc:Choice Requires="a14">
           <p:sp>
             <p:nvSpPr>
               <p:cNvPr id="7" name="TextBox 6">
@@ -9447,7 +9750,7 @@
             </p:txBody>
           </p:sp>
         </mc:Choice>
-        <mc:Fallback>
+        <mc:Fallback xmlns="">
           <p:sp>
             <p:nvSpPr>
               <p:cNvPr id="7" name="TextBox 6">
@@ -9538,8 +9841,8 @@
           </a:fontRef>
         </p:style>
       </p:cxnSp>
-      <mc:AlternateContent xmlns:mc="http://schemas.openxmlformats.org/markup-compatibility/2006">
-        <mc:Choice xmlns:a14="http://schemas.microsoft.com/office/drawing/2010/main" Requires="a14">
+      <mc:AlternateContent xmlns:mc="http://schemas.openxmlformats.org/markup-compatibility/2006" xmlns:a14="http://schemas.microsoft.com/office/drawing/2010/main">
+        <mc:Choice Requires="a14">
           <p:sp>
             <p:nvSpPr>
               <p:cNvPr id="9" name="TextBox 8">
@@ -9608,7 +9911,7 @@
             </p:txBody>
           </p:sp>
         </mc:Choice>
-        <mc:Fallback>
+        <mc:Fallback xmlns="">
           <p:sp>
             <p:nvSpPr>
               <p:cNvPr id="9" name="TextBox 8">

</xml_diff>